<commit_message>
Add Alternative App Fig 17
</commit_message>
<xml_diff>
--- a/Overview Image.pptx
+++ b/Overview Image.pptx
@@ -5,8 +5,7 @@
     <p:sldMasterId id="2147483660" r:id="rId1"/>
   </p:sldMasterIdLst>
   <p:sldIdLst>
-    <p:sldId id="256" r:id="rId2"/>
-    <p:sldId id="257" r:id="rId3"/>
+    <p:sldId id="257" r:id="rId2"/>
   </p:sldIdLst>
   <p:sldSz cx="3959225" cy="2879725"/>
   <p:notesSz cx="6858000" cy="9144000"/>
@@ -105,6 +104,11 @@
       </a:defRPr>
     </a:lvl9pPr>
   </p:defaultTextStyle>
+  <p:extLst>
+    <p:ext uri="{EFAFB233-063F-42B5-8137-9DF3F51BA10A}">
+      <p15:sldGuideLst xmlns:p15="http://schemas.microsoft.com/office/powerpoint/2012/main"/>
+    </p:ext>
+  </p:extLst>
 </p:presentation>
 </file>
 
@@ -239,7 +243,7 @@
           <a:p>
             <a:fld id="{08FC8209-9ADE-4AD6-9A7F-0AFF5BDF5613}" type="datetimeFigureOut">
               <a:rPr lang="de-DE" smtClean="0"/>
-              <a:t>06.04.2022</a:t>
+              <a:t>11.04.2022</a:t>
             </a:fld>
             <a:endParaRPr lang="de-DE"/>
           </a:p>
@@ -409,7 +413,7 @@
           <a:p>
             <a:fld id="{08FC8209-9ADE-4AD6-9A7F-0AFF5BDF5613}" type="datetimeFigureOut">
               <a:rPr lang="de-DE" smtClean="0"/>
-              <a:t>06.04.2022</a:t>
+              <a:t>11.04.2022</a:t>
             </a:fld>
             <a:endParaRPr lang="de-DE"/>
           </a:p>
@@ -589,7 +593,7 @@
           <a:p>
             <a:fld id="{08FC8209-9ADE-4AD6-9A7F-0AFF5BDF5613}" type="datetimeFigureOut">
               <a:rPr lang="de-DE" smtClean="0"/>
-              <a:t>06.04.2022</a:t>
+              <a:t>11.04.2022</a:t>
             </a:fld>
             <a:endParaRPr lang="de-DE"/>
           </a:p>
@@ -759,7 +763,7 @@
           <a:p>
             <a:fld id="{08FC8209-9ADE-4AD6-9A7F-0AFF5BDF5613}" type="datetimeFigureOut">
               <a:rPr lang="de-DE" smtClean="0"/>
-              <a:t>06.04.2022</a:t>
+              <a:t>11.04.2022</a:t>
             </a:fld>
             <a:endParaRPr lang="de-DE"/>
           </a:p>
@@ -1003,7 +1007,7 @@
           <a:p>
             <a:fld id="{08FC8209-9ADE-4AD6-9A7F-0AFF5BDF5613}" type="datetimeFigureOut">
               <a:rPr lang="de-DE" smtClean="0"/>
-              <a:t>06.04.2022</a:t>
+              <a:t>11.04.2022</a:t>
             </a:fld>
             <a:endParaRPr lang="de-DE"/>
           </a:p>
@@ -1235,7 +1239,7 @@
           <a:p>
             <a:fld id="{08FC8209-9ADE-4AD6-9A7F-0AFF5BDF5613}" type="datetimeFigureOut">
               <a:rPr lang="de-DE" smtClean="0"/>
-              <a:t>06.04.2022</a:t>
+              <a:t>11.04.2022</a:t>
             </a:fld>
             <a:endParaRPr lang="de-DE"/>
           </a:p>
@@ -1602,7 +1606,7 @@
           <a:p>
             <a:fld id="{08FC8209-9ADE-4AD6-9A7F-0AFF5BDF5613}" type="datetimeFigureOut">
               <a:rPr lang="de-DE" smtClean="0"/>
-              <a:t>06.04.2022</a:t>
+              <a:t>11.04.2022</a:t>
             </a:fld>
             <a:endParaRPr lang="de-DE"/>
           </a:p>
@@ -1720,7 +1724,7 @@
           <a:p>
             <a:fld id="{08FC8209-9ADE-4AD6-9A7F-0AFF5BDF5613}" type="datetimeFigureOut">
               <a:rPr lang="de-DE" smtClean="0"/>
-              <a:t>06.04.2022</a:t>
+              <a:t>11.04.2022</a:t>
             </a:fld>
             <a:endParaRPr lang="de-DE"/>
           </a:p>
@@ -1815,7 +1819,7 @@
           <a:p>
             <a:fld id="{08FC8209-9ADE-4AD6-9A7F-0AFF5BDF5613}" type="datetimeFigureOut">
               <a:rPr lang="de-DE" smtClean="0"/>
-              <a:t>06.04.2022</a:t>
+              <a:t>11.04.2022</a:t>
             </a:fld>
             <a:endParaRPr lang="de-DE"/>
           </a:p>
@@ -2092,7 +2096,7 @@
           <a:p>
             <a:fld id="{08FC8209-9ADE-4AD6-9A7F-0AFF5BDF5613}" type="datetimeFigureOut">
               <a:rPr lang="de-DE" smtClean="0"/>
-              <a:t>06.04.2022</a:t>
+              <a:t>11.04.2022</a:t>
             </a:fld>
             <a:endParaRPr lang="de-DE"/>
           </a:p>
@@ -2349,7 +2353,7 @@
           <a:p>
             <a:fld id="{08FC8209-9ADE-4AD6-9A7F-0AFF5BDF5613}" type="datetimeFigureOut">
               <a:rPr lang="de-DE" smtClean="0"/>
-              <a:t>06.04.2022</a:t>
+              <a:t>11.04.2022</a:t>
             </a:fld>
             <a:endParaRPr lang="de-DE"/>
           </a:p>
@@ -2562,7 +2566,7 @@
           <a:p>
             <a:fld id="{08FC8209-9ADE-4AD6-9A7F-0AFF5BDF5613}" type="datetimeFigureOut">
               <a:rPr lang="de-DE" smtClean="0"/>
-              <a:t>06.04.2022</a:t>
+              <a:t>11.04.2022</a:t>
             </a:fld>
             <a:endParaRPr lang="de-DE"/>
           </a:p>
@@ -2951,482 +2955,6 @@
 </file>
 
 <file path=ppt/slides/slide1.xml><?xml version="1.0" encoding="utf-8"?>
-<p:sld xmlns:a="http://schemas.openxmlformats.org/drawingml/2006/main" xmlns:r="http://schemas.openxmlformats.org/officeDocument/2006/relationships" xmlns:p="http://schemas.openxmlformats.org/presentationml/2006/main">
-  <p:cSld>
-    <p:spTree>
-      <p:nvGrpSpPr>
-        <p:cNvPr id="1" name=""/>
-        <p:cNvGrpSpPr/>
-        <p:nvPr/>
-      </p:nvGrpSpPr>
-      <p:grpSpPr>
-        <a:xfrm>
-          <a:off x="0" y="0"/>
-          <a:ext cx="0" cy="0"/>
-          <a:chOff x="0" y="0"/>
-          <a:chExt cx="0" cy="0"/>
-        </a:xfrm>
-      </p:grpSpPr>
-      <p:pic>
-        <p:nvPicPr>
-          <p:cNvPr id="20" name="Grafik 19">
-            <a:extLst>
-              <a:ext uri="{FF2B5EF4-FFF2-40B4-BE49-F238E27FC236}">
-                <a16:creationId xmlns:a16="http://schemas.microsoft.com/office/drawing/2014/main" id="{420E9DF9-55B5-4B6C-95EF-9755874DF967}"/>
-              </a:ext>
-            </a:extLst>
-          </p:cNvPr>
-          <p:cNvPicPr>
-            <a:picLocks noChangeAspect="1"/>
-          </p:cNvPicPr>
-          <p:nvPr/>
-        </p:nvPicPr>
-        <p:blipFill rotWithShape="1">
-          <a:blip r:embed="rId2"/>
-          <a:srcRect r="9253"/>
-          <a:stretch/>
-        </p:blipFill>
-        <p:spPr>
-          <a:xfrm>
-            <a:off x="1903849" y="261418"/>
-            <a:ext cx="1924704" cy="1413967"/>
-          </a:xfrm>
-          <a:prstGeom prst="rect">
-            <a:avLst/>
-          </a:prstGeom>
-        </p:spPr>
-      </p:pic>
-      <p:pic>
-        <p:nvPicPr>
-          <p:cNvPr id="7" name="Grafik 6">
-            <a:extLst>
-              <a:ext uri="{FF2B5EF4-FFF2-40B4-BE49-F238E27FC236}">
-                <a16:creationId xmlns:a16="http://schemas.microsoft.com/office/drawing/2014/main" id="{3DF03A02-9FCF-48F2-AA49-DBF8ED40B9EE}"/>
-              </a:ext>
-            </a:extLst>
-          </p:cNvPr>
-          <p:cNvPicPr>
-            <a:picLocks noChangeAspect="1"/>
-          </p:cNvPicPr>
-          <p:nvPr/>
-        </p:nvPicPr>
-        <p:blipFill>
-          <a:blip r:embed="rId3"/>
-          <a:stretch>
-            <a:fillRect/>
-          </a:stretch>
-        </p:blipFill>
-        <p:spPr>
-          <a:xfrm>
-            <a:off x="100484" y="227091"/>
-            <a:ext cx="1778644" cy="1185763"/>
-          </a:xfrm>
-          <a:prstGeom prst="rect">
-            <a:avLst/>
-          </a:prstGeom>
-        </p:spPr>
-      </p:pic>
-      <p:cxnSp>
-        <p:nvCxnSpPr>
-          <p:cNvPr id="9" name="Gerader Verbinder 8">
-            <a:extLst>
-              <a:ext uri="{FF2B5EF4-FFF2-40B4-BE49-F238E27FC236}">
-                <a16:creationId xmlns:a16="http://schemas.microsoft.com/office/drawing/2014/main" id="{FAFD89BE-30C3-4FD4-B4C8-2465B460DD9B}"/>
-              </a:ext>
-            </a:extLst>
-          </p:cNvPr>
-          <p:cNvCxnSpPr/>
-          <p:nvPr/>
-        </p:nvCxnSpPr>
-        <p:spPr>
-          <a:xfrm>
-            <a:off x="-1" y="1466870"/>
-            <a:ext cx="3959225" cy="0"/>
-          </a:xfrm>
-          <a:prstGeom prst="line">
-            <a:avLst/>
-          </a:prstGeom>
-          <a:ln w="12700"/>
-        </p:spPr>
-        <p:style>
-          <a:lnRef idx="1">
-            <a:schemeClr val="dk1"/>
-          </a:lnRef>
-          <a:fillRef idx="0">
-            <a:schemeClr val="dk1"/>
-          </a:fillRef>
-          <a:effectRef idx="0">
-            <a:schemeClr val="dk1"/>
-          </a:effectRef>
-          <a:fontRef idx="minor">
-            <a:schemeClr val="tx1"/>
-          </a:fontRef>
-        </p:style>
-      </p:cxnSp>
-      <p:cxnSp>
-        <p:nvCxnSpPr>
-          <p:cNvPr id="10" name="Gerader Verbinder 9">
-            <a:extLst>
-              <a:ext uri="{FF2B5EF4-FFF2-40B4-BE49-F238E27FC236}">
-                <a16:creationId xmlns:a16="http://schemas.microsoft.com/office/drawing/2014/main" id="{C33D9E18-4BCB-4CDE-A8A6-C03CFECDF9E4}"/>
-              </a:ext>
-            </a:extLst>
-          </p:cNvPr>
-          <p:cNvCxnSpPr>
-            <a:cxnSpLocks/>
-          </p:cNvCxnSpPr>
-          <p:nvPr/>
-        </p:nvCxnSpPr>
-        <p:spPr>
-          <a:xfrm>
-            <a:off x="1979612" y="261418"/>
-            <a:ext cx="0" cy="2618306"/>
-          </a:xfrm>
-          <a:prstGeom prst="line">
-            <a:avLst/>
-          </a:prstGeom>
-          <a:ln w="12700"/>
-        </p:spPr>
-        <p:style>
-          <a:lnRef idx="1">
-            <a:schemeClr val="dk1"/>
-          </a:lnRef>
-          <a:fillRef idx="0">
-            <a:schemeClr val="dk1"/>
-          </a:fillRef>
-          <a:effectRef idx="0">
-            <a:schemeClr val="dk1"/>
-          </a:effectRef>
-          <a:fontRef idx="minor">
-            <a:schemeClr val="tx1"/>
-          </a:fontRef>
-        </p:style>
-      </p:cxnSp>
-      <p:sp>
-        <p:nvSpPr>
-          <p:cNvPr id="14" name="Textfeld 13">
-            <a:extLst>
-              <a:ext uri="{FF2B5EF4-FFF2-40B4-BE49-F238E27FC236}">
-                <a16:creationId xmlns:a16="http://schemas.microsoft.com/office/drawing/2014/main" id="{B0F10052-AD7E-4387-8B0B-C08C488CAAB2}"/>
-              </a:ext>
-            </a:extLst>
-          </p:cNvPr>
-          <p:cNvSpPr txBox="1"/>
-          <p:nvPr/>
-        </p:nvSpPr>
-        <p:spPr>
-          <a:xfrm>
-            <a:off x="131439" y="45621"/>
-            <a:ext cx="3727302" cy="207749"/>
-          </a:xfrm>
-          <a:prstGeom prst="rect">
-            <a:avLst/>
-          </a:prstGeom>
-          <a:noFill/>
-        </p:spPr>
-        <p:txBody>
-          <a:bodyPr wrap="none" rtlCol="0">
-            <a:spAutoFit/>
-          </a:bodyPr>
-          <a:lstStyle/>
-          <a:p>
-            <a:r>
-              <a:rPr lang="en-GB" sz="750"/>
-              <a:t>Microenvironmental response identifies CLL subgroups with distinct progression dynamics</a:t>
-            </a:r>
-          </a:p>
-        </p:txBody>
-      </p:sp>
-      <p:grpSp>
-        <p:nvGrpSpPr>
-          <p:cNvPr id="26" name="Gruppieren 25">
-            <a:extLst>
-              <a:ext uri="{FF2B5EF4-FFF2-40B4-BE49-F238E27FC236}">
-                <a16:creationId xmlns:a16="http://schemas.microsoft.com/office/drawing/2014/main" id="{D3CDF704-C1C7-4297-86FA-29D7E7A4DFF9}"/>
-              </a:ext>
-            </a:extLst>
-          </p:cNvPr>
-          <p:cNvGrpSpPr/>
-          <p:nvPr/>
-        </p:nvGrpSpPr>
-        <p:grpSpPr>
-          <a:xfrm>
-            <a:off x="2004615" y="1808577"/>
-            <a:ext cx="1924705" cy="1033147"/>
-            <a:chOff x="1" y="745408"/>
-            <a:chExt cx="3959224" cy="2125240"/>
-          </a:xfrm>
-        </p:grpSpPr>
-        <p:pic>
-          <p:nvPicPr>
-            <p:cNvPr id="23" name="Grafik 22">
-              <a:extLst>
-                <a:ext uri="{FF2B5EF4-FFF2-40B4-BE49-F238E27FC236}">
-                  <a16:creationId xmlns:a16="http://schemas.microsoft.com/office/drawing/2014/main" id="{436A990F-72FB-4786-BDC1-1F252415181B}"/>
-                </a:ext>
-              </a:extLst>
-            </p:cNvPr>
-            <p:cNvPicPr>
-              <a:picLocks noChangeAspect="1"/>
-            </p:cNvPicPr>
-            <p:nvPr/>
-          </p:nvPicPr>
-          <p:blipFill rotWithShape="1">
-            <a:blip r:embed="rId4">
-              <a:extLst>
-                <a:ext uri="{28A0092B-C50C-407E-A947-70E740481C1C}">
-                  <a14:useLocalDpi xmlns:a14="http://schemas.microsoft.com/office/drawing/2010/main" val="0"/>
-                </a:ext>
-              </a:extLst>
-            </a:blip>
-            <a:srcRect t="25731" r="50000"/>
-            <a:stretch/>
-          </p:blipFill>
-          <p:spPr>
-            <a:xfrm>
-              <a:off x="1" y="745408"/>
-              <a:ext cx="1979613" cy="2125240"/>
-            </a:xfrm>
-            <a:prstGeom prst="rect">
-              <a:avLst/>
-            </a:prstGeom>
-          </p:spPr>
-        </p:pic>
-        <p:pic>
-          <p:nvPicPr>
-            <p:cNvPr id="25" name="Grafik 24">
-              <a:extLst>
-                <a:ext uri="{FF2B5EF4-FFF2-40B4-BE49-F238E27FC236}">
-                  <a16:creationId xmlns:a16="http://schemas.microsoft.com/office/drawing/2014/main" id="{13D55FB1-402D-4F01-8E59-469716F55FE2}"/>
-                </a:ext>
-              </a:extLst>
-            </p:cNvPr>
-            <p:cNvPicPr>
-              <a:picLocks noChangeAspect="1"/>
-            </p:cNvPicPr>
-            <p:nvPr/>
-          </p:nvPicPr>
-          <p:blipFill rotWithShape="1">
-            <a:blip r:embed="rId5">
-              <a:extLst>
-                <a:ext uri="{28A0092B-C50C-407E-A947-70E740481C1C}">
-                  <a14:useLocalDpi xmlns:a14="http://schemas.microsoft.com/office/drawing/2010/main" val="0"/>
-                </a:ext>
-              </a:extLst>
-            </a:blip>
-            <a:srcRect l="50000" t="25731"/>
-            <a:stretch/>
-          </p:blipFill>
-          <p:spPr>
-            <a:xfrm>
-              <a:off x="1979612" y="745408"/>
-              <a:ext cx="1979613" cy="2125240"/>
-            </a:xfrm>
-            <a:prstGeom prst="rect">
-              <a:avLst/>
-            </a:prstGeom>
-          </p:spPr>
-        </p:pic>
-      </p:grpSp>
-      <p:sp>
-        <p:nvSpPr>
-          <p:cNvPr id="27" name="Textfeld 26">
-            <a:extLst>
-              <a:ext uri="{FF2B5EF4-FFF2-40B4-BE49-F238E27FC236}">
-                <a16:creationId xmlns:a16="http://schemas.microsoft.com/office/drawing/2014/main" id="{A64240AF-9978-43F9-AFAA-96D2DB59DF9E}"/>
-              </a:ext>
-            </a:extLst>
-          </p:cNvPr>
-          <p:cNvSpPr txBox="1"/>
-          <p:nvPr/>
-        </p:nvSpPr>
-        <p:spPr>
-          <a:xfrm>
-            <a:off x="2004616" y="1544788"/>
-            <a:ext cx="1924704" cy="207749"/>
-          </a:xfrm>
-          <a:prstGeom prst="rect">
-            <a:avLst/>
-          </a:prstGeom>
-          <a:noFill/>
-        </p:spPr>
-        <p:txBody>
-          <a:bodyPr wrap="square" rtlCol="0">
-            <a:spAutoFit/>
-          </a:bodyPr>
-          <a:lstStyle/>
-          <a:p>
-            <a:pPr algn="ctr"/>
-            <a:r>
-              <a:rPr lang="en-GB" sz="750" dirty="0"/>
-              <a:t>IL4 activity is increased in CLL lymph nodes</a:t>
-            </a:r>
-          </a:p>
-        </p:txBody>
-      </p:sp>
-      <p:sp>
-        <p:nvSpPr>
-          <p:cNvPr id="28" name="Textfeld 27">
-            <a:extLst>
-              <a:ext uri="{FF2B5EF4-FFF2-40B4-BE49-F238E27FC236}">
-                <a16:creationId xmlns:a16="http://schemas.microsoft.com/office/drawing/2014/main" id="{3633FA9B-DC4A-4B66-A64B-4458E391BBC1}"/>
-              </a:ext>
-            </a:extLst>
-          </p:cNvPr>
-          <p:cNvSpPr txBox="1"/>
-          <p:nvPr/>
-        </p:nvSpPr>
-        <p:spPr>
-          <a:xfrm>
-            <a:off x="2274009" y="1810133"/>
-            <a:ext cx="430077" cy="276999"/>
-          </a:xfrm>
-          <a:prstGeom prst="rect">
-            <a:avLst/>
-          </a:prstGeom>
-          <a:noFill/>
-        </p:spPr>
-        <p:txBody>
-          <a:bodyPr wrap="square" rtlCol="0">
-            <a:spAutoFit/>
-          </a:bodyPr>
-          <a:lstStyle/>
-          <a:p>
-            <a:pPr algn="ctr"/>
-            <a:r>
-              <a:rPr lang="en-GB" sz="1200">
-                <a:effectLst>
-                  <a:outerShdw blurRad="63500" sx="102000" sy="102000" algn="ctr" rotWithShape="0">
-                    <a:schemeClr val="bg1"/>
-                  </a:outerShdw>
-                </a:effectLst>
-              </a:rPr>
-              <a:t>CLL</a:t>
-            </a:r>
-          </a:p>
-        </p:txBody>
-      </p:sp>
-      <p:sp>
-        <p:nvSpPr>
-          <p:cNvPr id="29" name="Textfeld 28">
-            <a:extLst>
-              <a:ext uri="{FF2B5EF4-FFF2-40B4-BE49-F238E27FC236}">
-                <a16:creationId xmlns:a16="http://schemas.microsoft.com/office/drawing/2014/main" id="{B9C1CE7F-C263-4977-A85E-610196F87AC1}"/>
-              </a:ext>
-            </a:extLst>
-          </p:cNvPr>
-          <p:cNvSpPr txBox="1"/>
-          <p:nvPr/>
-        </p:nvSpPr>
-        <p:spPr>
-          <a:xfrm>
-            <a:off x="3092411" y="1808577"/>
-            <a:ext cx="711465" cy="276999"/>
-          </a:xfrm>
-          <a:prstGeom prst="rect">
-            <a:avLst/>
-          </a:prstGeom>
-          <a:noFill/>
-        </p:spPr>
-        <p:txBody>
-          <a:bodyPr wrap="square" rtlCol="0">
-            <a:spAutoFit/>
-          </a:bodyPr>
-          <a:lstStyle/>
-          <a:p>
-            <a:pPr algn="ctr"/>
-            <a:r>
-              <a:rPr lang="en-GB" sz="1200">
-                <a:effectLst>
-                  <a:outerShdw blurRad="63500" sx="102000" sy="102000" algn="ctr" rotWithShape="0">
-                    <a:schemeClr val="bg1"/>
-                  </a:outerShdw>
-                </a:effectLst>
-              </a:rPr>
-              <a:t>Healthy</a:t>
-            </a:r>
-          </a:p>
-        </p:txBody>
-      </p:sp>
-      <p:pic>
-        <p:nvPicPr>
-          <p:cNvPr id="31" name="Grafik 30">
-            <a:extLst>
-              <a:ext uri="{FF2B5EF4-FFF2-40B4-BE49-F238E27FC236}">
-                <a16:creationId xmlns:a16="http://schemas.microsoft.com/office/drawing/2014/main" id="{40B139E7-FAD2-4428-ABA4-B1A003FD0A04}"/>
-              </a:ext>
-            </a:extLst>
-          </p:cNvPr>
-          <p:cNvPicPr>
-            <a:picLocks noChangeAspect="1"/>
-          </p:cNvPicPr>
-          <p:nvPr/>
-        </p:nvPicPr>
-        <p:blipFill rotWithShape="1">
-          <a:blip r:embed="rId6"/>
-          <a:srcRect t="4878" b="26636"/>
-          <a:stretch/>
-        </p:blipFill>
-        <p:spPr>
-          <a:xfrm>
-            <a:off x="14674" y="1832046"/>
-            <a:ext cx="1889175" cy="862550"/>
-          </a:xfrm>
-          <a:prstGeom prst="rect">
-            <a:avLst/>
-          </a:prstGeom>
-        </p:spPr>
-      </p:pic>
-      <p:sp>
-        <p:nvSpPr>
-          <p:cNvPr id="32" name="Textfeld 31">
-            <a:extLst>
-              <a:ext uri="{FF2B5EF4-FFF2-40B4-BE49-F238E27FC236}">
-                <a16:creationId xmlns:a16="http://schemas.microsoft.com/office/drawing/2014/main" id="{BCA75D44-AD85-4EA2-84A2-D5837F855444}"/>
-              </a:ext>
-            </a:extLst>
-          </p:cNvPr>
-          <p:cNvSpPr txBox="1"/>
-          <p:nvPr/>
-        </p:nvSpPr>
-        <p:spPr>
-          <a:xfrm>
-            <a:off x="23483" y="1548918"/>
-            <a:ext cx="1924704" cy="323165"/>
-          </a:xfrm>
-          <a:prstGeom prst="rect">
-            <a:avLst/>
-          </a:prstGeom>
-          <a:noFill/>
-        </p:spPr>
-        <p:txBody>
-          <a:bodyPr wrap="square" rtlCol="0">
-            <a:spAutoFit/>
-          </a:bodyPr>
-          <a:lstStyle/>
-          <a:p>
-            <a:pPr algn="ctr"/>
-            <a:r>
-              <a:rPr lang="en-GB" sz="750" dirty="0"/>
-              <a:t>Trisomy 12 epigenetic profile can be countered by bromodomain inhibition</a:t>
-            </a:r>
-          </a:p>
-        </p:txBody>
-      </p:sp>
-    </p:spTree>
-    <p:extLst>
-      <p:ext uri="{BB962C8B-B14F-4D97-AF65-F5344CB8AC3E}">
-        <p14:creationId xmlns:p14="http://schemas.microsoft.com/office/powerpoint/2010/main" val="2912795869"/>
-      </p:ext>
-    </p:extLst>
-  </p:cSld>
-  <p:clrMapOvr>
-    <a:masterClrMapping/>
-  </p:clrMapOvr>
-</p:sld>
-</file>
-
-<file path=ppt/slides/slide2.xml><?xml version="1.0" encoding="utf-8"?>
 <p:sld xmlns:a="http://schemas.openxmlformats.org/drawingml/2006/main" xmlns:r="http://schemas.openxmlformats.org/officeDocument/2006/relationships" xmlns:p="http://schemas.openxmlformats.org/presentationml/2006/main">
   <p:cSld>
     <p:spTree>

</xml_diff>